<commit_message>
Updated version of pptx
</commit_message>
<xml_diff>
--- a/example_2/simple.pptx
+++ b/example_2/simple.pptx
@@ -4131,7 +4131,7 @@
             </a:r>
             <a:r>
               <a:rPr lang="en-US" dirty="0" err="1"/>
-              <a:t>izquierdi</a:t>
+              <a:t>derechi</a:t>
             </a:r>
             <a:r>
               <a:rPr lang="en-US" dirty="0"/>
@@ -4155,7 +4155,7 @@
             </a:r>
             <a:r>
               <a:rPr lang="en-US" dirty="0" err="1"/>
-              <a:t>izquierdi</a:t>
+              <a:t>derechi</a:t>
             </a:r>
             <a:r>
               <a:rPr lang="en-US" dirty="0"/>
@@ -4179,7 +4179,7 @@
             </a:r>
             <a:r>
               <a:rPr lang="en-US" dirty="0" err="1"/>
-              <a:t>izquierdi</a:t>
+              <a:t>derechi</a:t>
             </a:r>
             <a:r>
               <a:rPr lang="en-US" dirty="0"/>
@@ -4203,7 +4203,7 @@
             </a:r>
             <a:r>
               <a:rPr lang="en-US" dirty="0" err="1"/>
-              <a:t>izquierdi</a:t>
+              <a:t>derechi</a:t>
             </a:r>
             <a:r>
               <a:rPr lang="en-US" dirty="0"/>
@@ -4227,7 +4227,7 @@
             </a:r>
             <a:r>
               <a:rPr lang="en-US" dirty="0" err="1"/>
-              <a:t>izquierdi</a:t>
+              <a:t>derechi</a:t>
             </a:r>
             <a:r>
               <a:rPr lang="en-US" dirty="0"/>
@@ -4251,7 +4251,7 @@
             </a:r>
             <a:r>
               <a:rPr lang="en-US" dirty="0" err="1"/>
-              <a:t>izquierdi</a:t>
+              <a:t>derechi</a:t>
             </a:r>
             <a:r>
               <a:rPr lang="en-US" dirty="0"/>
@@ -4275,7 +4275,7 @@
             </a:r>
             <a:r>
               <a:rPr lang="en-US" dirty="0" err="1"/>
-              <a:t>izquierdi</a:t>
+              <a:t>derechi</a:t>
             </a:r>
             <a:r>
               <a:rPr lang="en-US" dirty="0"/>
@@ -4299,7 +4299,7 @@
             </a:r>
             <a:r>
               <a:rPr lang="en-US" dirty="0" err="1"/>
-              <a:t>izquierdi</a:t>
+              <a:t>derechi</a:t>
             </a:r>
             <a:r>
               <a:rPr lang="en-US" dirty="0"/>
@@ -4323,7 +4323,7 @@
             </a:r>
             <a:r>
               <a:rPr lang="en-US" dirty="0" err="1"/>
-              <a:t>izquierdi</a:t>
+              <a:t>derechi</a:t>
             </a:r>
             <a:r>
               <a:rPr lang="en-US" dirty="0"/>
@@ -4347,7 +4347,7 @@
             </a:r>
             <a:r>
               <a:rPr lang="en-US" dirty="0" err="1"/>
-              <a:t>izquierdi</a:t>
+              <a:t>derechi</a:t>
             </a:r>
             <a:r>
               <a:rPr lang="en-US" dirty="0"/>
@@ -4371,7 +4371,7 @@
             </a:r>
             <a:r>
               <a:rPr lang="en-US" dirty="0" err="1"/>
-              <a:t>izquierdi</a:t>
+              <a:t>derechi</a:t>
             </a:r>
             <a:r>
               <a:rPr lang="en-US" dirty="0"/>
@@ -4395,7 +4395,7 @@
             </a:r>
             <a:r>
               <a:rPr lang="en-US" dirty="0" err="1"/>
-              <a:t>izquierdi</a:t>
+              <a:t>derechi</a:t>
             </a:r>
             <a:r>
               <a:rPr lang="en-US" dirty="0"/>
@@ -4419,7 +4419,7 @@
             </a:r>
             <a:r>
               <a:rPr lang="en-US" dirty="0" err="1"/>
-              <a:t>izquierdi</a:t>
+              <a:t>derechi</a:t>
             </a:r>
             <a:r>
               <a:rPr lang="en-US" dirty="0"/>
@@ -4443,7 +4443,7 @@
             </a:r>
             <a:r>
               <a:rPr lang="en-US" dirty="0" err="1"/>
-              <a:t>izquierdi</a:t>
+              <a:t>derechi</a:t>
             </a:r>
             <a:r>
               <a:rPr lang="en-US" dirty="0"/>
@@ -4467,7 +4467,7 @@
             </a:r>
             <a:r>
               <a:rPr lang="en-US" dirty="0" err="1"/>
-              <a:t>izquierdi</a:t>
+              <a:t>derechi</a:t>
             </a:r>
             <a:r>
               <a:rPr lang="en-US" dirty="0"/>
@@ -4616,7 +4616,7 @@
             </a:r>
             <a:r>
               <a:rPr lang="en-US" dirty="0" err="1"/>
-              <a:t>izquierdi</a:t>
+              <a:t>derechi</a:t>
             </a:r>
             <a:r>
               <a:rPr lang="en-US" dirty="0"/>
@@ -4640,7 +4640,7 @@
             </a:r>
             <a:r>
               <a:rPr lang="en-US" dirty="0" err="1"/>
-              <a:t>izquierdi</a:t>
+              <a:t>derechi</a:t>
             </a:r>
             <a:r>
               <a:rPr lang="en-US" dirty="0"/>
@@ -4664,7 +4664,7 @@
             </a:r>
             <a:r>
               <a:rPr lang="en-US" dirty="0" err="1"/>
-              <a:t>izquierdi</a:t>
+              <a:t>derechi</a:t>
             </a:r>
             <a:r>
               <a:rPr lang="en-US" dirty="0"/>
@@ -4688,7 +4688,7 @@
             </a:r>
             <a:r>
               <a:rPr lang="en-US" dirty="0" err="1"/>
-              <a:t>izquierdi</a:t>
+              <a:t>derechi</a:t>
             </a:r>
             <a:r>
               <a:rPr lang="en-US" dirty="0"/>
@@ -4712,7 +4712,7 @@
             </a:r>
             <a:r>
               <a:rPr lang="en-US" dirty="0" err="1"/>
-              <a:t>izquierdi</a:t>
+              <a:t>derechi</a:t>
             </a:r>
             <a:r>
               <a:rPr lang="en-US" dirty="0"/>
@@ -4736,7 +4736,7 @@
             </a:r>
             <a:r>
               <a:rPr lang="en-US" dirty="0" err="1"/>
-              <a:t>izquierdi</a:t>
+              <a:t>derechi</a:t>
             </a:r>
             <a:r>
               <a:rPr lang="en-US" dirty="0"/>
@@ -4760,7 +4760,7 @@
             </a:r>
             <a:r>
               <a:rPr lang="en-US" dirty="0" err="1"/>
-              <a:t>izquierdi</a:t>
+              <a:t>derechi</a:t>
             </a:r>
             <a:r>
               <a:rPr lang="en-US" dirty="0"/>
@@ -4784,7 +4784,7 @@
             </a:r>
             <a:r>
               <a:rPr lang="en-US" dirty="0" err="1"/>
-              <a:t>izquierdi</a:t>
+              <a:t>derechi</a:t>
             </a:r>
             <a:r>
               <a:rPr lang="en-US" dirty="0"/>
@@ -4808,7 +4808,7 @@
             </a:r>
             <a:r>
               <a:rPr lang="en-US" dirty="0" err="1"/>
-              <a:t>izquierdi</a:t>
+              <a:t>derechi</a:t>
             </a:r>
             <a:r>
               <a:rPr lang="en-US" dirty="0"/>
@@ -4832,7 +4832,7 @@
             </a:r>
             <a:r>
               <a:rPr lang="en-US" dirty="0" err="1"/>
-              <a:t>izquierdi</a:t>
+              <a:t>derechi</a:t>
             </a:r>
             <a:r>
               <a:rPr lang="en-US" dirty="0"/>
@@ -4856,7 +4856,7 @@
             </a:r>
             <a:r>
               <a:rPr lang="en-US" dirty="0" err="1"/>
-              <a:t>izquierdi</a:t>
+              <a:t>derechi</a:t>
             </a:r>
             <a:r>
               <a:rPr lang="en-US" dirty="0"/>
@@ -4880,7 +4880,7 @@
             </a:r>
             <a:r>
               <a:rPr lang="en-US" dirty="0" err="1"/>
-              <a:t>izquierdi</a:t>
+              <a:t>derechi</a:t>
             </a:r>
             <a:r>
               <a:rPr lang="en-US" dirty="0"/>
@@ -4904,7 +4904,7 @@
             </a:r>
             <a:r>
               <a:rPr lang="en-US" dirty="0" err="1"/>
-              <a:t>izquierdi</a:t>
+              <a:t>derechi</a:t>
             </a:r>
             <a:r>
               <a:rPr lang="en-US" dirty="0"/>
@@ -4928,7 +4928,7 @@
             </a:r>
             <a:r>
               <a:rPr lang="en-US" dirty="0" err="1"/>
-              <a:t>izquierdi</a:t>
+              <a:t>derechi</a:t>
             </a:r>
             <a:r>
               <a:rPr lang="en-US" dirty="0"/>
@@ -4952,7 +4952,7 @@
             </a:r>
             <a:r>
               <a:rPr lang="en-US" dirty="0" err="1"/>
-              <a:t>izquierdi</a:t>
+              <a:t>derechi</a:t>
             </a:r>
             <a:r>
               <a:rPr lang="en-US" dirty="0"/>
@@ -4976,7 +4976,7 @@
             </a:r>
             <a:r>
               <a:rPr lang="en-US" dirty="0" err="1"/>
-              <a:t>izquierdi</a:t>
+              <a:t>derechi</a:t>
             </a:r>
             <a:r>
               <a:rPr lang="en-US" dirty="0"/>
@@ -5390,276 +5390,6 @@
               <a:t> content -  </a:t>
             </a:r>
           </a:p>
-          <a:p>
-            <a:endParaRPr lang="en-US" dirty="0"/>
-          </a:p>
-        </p:txBody>
-      </p:sp>
-      <p:sp>
-        <p:nvSpPr>
-          <p:cNvPr id="10" name="Content Placeholder 5">
-            <a:extLst>
-              <a:ext uri="{FF2B5EF4-FFF2-40B4-BE49-F238E27FC236}">
-                <a16:creationId xmlns:a16="http://schemas.microsoft.com/office/drawing/2014/main" id="{B9EDF57C-D77E-5F46-B22C-762045F7D38F}"/>
-              </a:ext>
-            </a:extLst>
-          </p:cNvPr>
-          <p:cNvSpPr txBox="1">
-            <a:spLocks/>
-          </p:cNvSpPr>
-          <p:nvPr/>
-        </p:nvSpPr>
-        <p:spPr>
-          <a:xfrm>
-            <a:off x="5021843" y="4114745"/>
-            <a:ext cx="6133837" cy="1776248"/>
-          </a:xfrm>
-          <a:prstGeom prst="rect">
-            <a:avLst/>
-          </a:prstGeom>
-        </p:spPr>
-        <p:txBody>
-          <a:bodyPr vert="horz" lIns="0" tIns="45720" rIns="0" bIns="45720" rtlCol="0">
-            <a:normAutofit/>
-          </a:bodyPr>
-          <a:lstStyle>
-            <a:lvl1pPr marL="91440" indent="-91440" algn="l" defTabSz="914400" rtl="0" eaLnBrk="1" latinLnBrk="0" hangingPunct="1">
-              <a:lnSpc>
-                <a:spcPct val="120000"/>
-              </a:lnSpc>
-              <a:spcBef>
-                <a:spcPts val="1200"/>
-              </a:spcBef>
-              <a:spcAft>
-                <a:spcPts val="200"/>
-              </a:spcAft>
-              <a:buClr>
-                <a:schemeClr val="accent1"/>
-              </a:buClr>
-              <a:buSzPct val="100000"/>
-              <a:buFont typeface="Calibri" panose="020F0502020204030204" pitchFamily="34" charset="0"/>
-              <a:buChar char=" "/>
-              <a:defRPr sz="1800" kern="1200">
-                <a:solidFill>
-                  <a:schemeClr val="tx1">
-                    <a:lumMod val="75000"/>
-                    <a:lumOff val="25000"/>
-                  </a:schemeClr>
-                </a:solidFill>
-                <a:latin typeface="+mn-lt"/>
-                <a:ea typeface="+mn-ea"/>
-                <a:cs typeface="+mn-cs"/>
-              </a:defRPr>
-            </a:lvl1pPr>
-            <a:lvl2pPr marL="384048" indent="-182880" algn="l" defTabSz="914400" rtl="0" eaLnBrk="1" latinLnBrk="0" hangingPunct="1">
-              <a:lnSpc>
-                <a:spcPct val="100000"/>
-              </a:lnSpc>
-              <a:spcBef>
-                <a:spcPts val="200"/>
-              </a:spcBef>
-              <a:spcAft>
-                <a:spcPts val="400"/>
-              </a:spcAft>
-              <a:buClrTx/>
-              <a:buFont typeface="Calibri" pitchFamily="34" charset="0"/>
-              <a:buChar char="◦"/>
-              <a:defRPr sz="1600" kern="1200">
-                <a:solidFill>
-                  <a:schemeClr val="tx1">
-                    <a:lumMod val="75000"/>
-                    <a:lumOff val="25000"/>
-                  </a:schemeClr>
-                </a:solidFill>
-                <a:latin typeface="+mn-lt"/>
-                <a:ea typeface="+mn-ea"/>
-                <a:cs typeface="+mn-cs"/>
-              </a:defRPr>
-            </a:lvl2pPr>
-            <a:lvl3pPr marL="566928" indent="-182880" algn="l" defTabSz="914400" rtl="0" eaLnBrk="1" latinLnBrk="0" hangingPunct="1">
-              <a:lnSpc>
-                <a:spcPct val="100000"/>
-              </a:lnSpc>
-              <a:spcBef>
-                <a:spcPts val="200"/>
-              </a:spcBef>
-              <a:spcAft>
-                <a:spcPts val="400"/>
-              </a:spcAft>
-              <a:buClrTx/>
-              <a:buFont typeface="Calibri" pitchFamily="34" charset="0"/>
-              <a:buChar char="◦"/>
-              <a:defRPr sz="1200" kern="1200">
-                <a:solidFill>
-                  <a:schemeClr val="tx1">
-                    <a:lumMod val="75000"/>
-                    <a:lumOff val="25000"/>
-                  </a:schemeClr>
-                </a:solidFill>
-                <a:latin typeface="+mn-lt"/>
-                <a:ea typeface="+mn-ea"/>
-                <a:cs typeface="+mn-cs"/>
-              </a:defRPr>
-            </a:lvl3pPr>
-            <a:lvl4pPr marL="749808" indent="-182880" algn="l" defTabSz="914400" rtl="0" eaLnBrk="1" latinLnBrk="0" hangingPunct="1">
-              <a:lnSpc>
-                <a:spcPct val="100000"/>
-              </a:lnSpc>
-              <a:spcBef>
-                <a:spcPts val="200"/>
-              </a:spcBef>
-              <a:spcAft>
-                <a:spcPts val="400"/>
-              </a:spcAft>
-              <a:buClrTx/>
-              <a:buFont typeface="Calibri" pitchFamily="34" charset="0"/>
-              <a:buChar char="◦"/>
-              <a:defRPr sz="1200" kern="1200">
-                <a:solidFill>
-                  <a:schemeClr val="tx1">
-                    <a:lumMod val="75000"/>
-                    <a:lumOff val="25000"/>
-                  </a:schemeClr>
-                </a:solidFill>
-                <a:latin typeface="+mn-lt"/>
-                <a:ea typeface="+mn-ea"/>
-                <a:cs typeface="+mn-cs"/>
-              </a:defRPr>
-            </a:lvl4pPr>
-            <a:lvl5pPr marL="932688" indent="-182880" algn="l" defTabSz="914400" rtl="0" eaLnBrk="1" latinLnBrk="0" hangingPunct="1">
-              <a:lnSpc>
-                <a:spcPct val="100000"/>
-              </a:lnSpc>
-              <a:spcBef>
-                <a:spcPts val="200"/>
-              </a:spcBef>
-              <a:spcAft>
-                <a:spcPts val="400"/>
-              </a:spcAft>
-              <a:buClrTx/>
-              <a:buFont typeface="Calibri" pitchFamily="34" charset="0"/>
-              <a:buChar char="◦"/>
-              <a:defRPr sz="1200" kern="1200">
-                <a:solidFill>
-                  <a:schemeClr val="tx1">
-                    <a:lumMod val="75000"/>
-                    <a:lumOff val="25000"/>
-                  </a:schemeClr>
-                </a:solidFill>
-                <a:latin typeface="+mn-lt"/>
-                <a:ea typeface="+mn-ea"/>
-                <a:cs typeface="+mn-cs"/>
-              </a:defRPr>
-            </a:lvl5pPr>
-            <a:lvl6pPr marL="1100000" indent="-228600" algn="l" defTabSz="914400" rtl="0" eaLnBrk="1" latinLnBrk="0" hangingPunct="1">
-              <a:lnSpc>
-                <a:spcPct val="90000"/>
-              </a:lnSpc>
-              <a:spcBef>
-                <a:spcPts val="200"/>
-              </a:spcBef>
-              <a:spcAft>
-                <a:spcPts val="400"/>
-              </a:spcAft>
-              <a:buClr>
-                <a:schemeClr val="accent1"/>
-              </a:buClr>
-              <a:buFont typeface="Calibri" pitchFamily="34" charset="0"/>
-              <a:buChar char="◦"/>
-              <a:defRPr sz="1400" kern="1200">
-                <a:solidFill>
-                  <a:schemeClr val="tx1">
-                    <a:lumMod val="75000"/>
-                    <a:lumOff val="25000"/>
-                  </a:schemeClr>
-                </a:solidFill>
-                <a:latin typeface="+mn-lt"/>
-                <a:ea typeface="+mn-ea"/>
-                <a:cs typeface="+mn-cs"/>
-              </a:defRPr>
-            </a:lvl6pPr>
-            <a:lvl7pPr marL="1300000" indent="-228600" algn="l" defTabSz="914400" rtl="0" eaLnBrk="1" latinLnBrk="0" hangingPunct="1">
-              <a:lnSpc>
-                <a:spcPct val="90000"/>
-              </a:lnSpc>
-              <a:spcBef>
-                <a:spcPts val="200"/>
-              </a:spcBef>
-              <a:spcAft>
-                <a:spcPts val="400"/>
-              </a:spcAft>
-              <a:buClr>
-                <a:schemeClr val="accent1"/>
-              </a:buClr>
-              <a:buFont typeface="Calibri" pitchFamily="34" charset="0"/>
-              <a:buChar char="◦"/>
-              <a:defRPr sz="1400" kern="1200">
-                <a:solidFill>
-                  <a:schemeClr val="tx1">
-                    <a:lumMod val="75000"/>
-                    <a:lumOff val="25000"/>
-                  </a:schemeClr>
-                </a:solidFill>
-                <a:latin typeface="+mn-lt"/>
-                <a:ea typeface="+mn-ea"/>
-                <a:cs typeface="+mn-cs"/>
-              </a:defRPr>
-            </a:lvl7pPr>
-            <a:lvl8pPr marL="1500000" indent="-228600" algn="l" defTabSz="914400" rtl="0" eaLnBrk="1" latinLnBrk="0" hangingPunct="1">
-              <a:lnSpc>
-                <a:spcPct val="90000"/>
-              </a:lnSpc>
-              <a:spcBef>
-                <a:spcPts val="200"/>
-              </a:spcBef>
-              <a:spcAft>
-                <a:spcPts val="400"/>
-              </a:spcAft>
-              <a:buClr>
-                <a:schemeClr val="accent1"/>
-              </a:buClr>
-              <a:buFont typeface="Calibri" pitchFamily="34" charset="0"/>
-              <a:buChar char="◦"/>
-              <a:defRPr sz="1400" kern="1200">
-                <a:solidFill>
-                  <a:schemeClr val="tx1">
-                    <a:lumMod val="75000"/>
-                    <a:lumOff val="25000"/>
-                  </a:schemeClr>
-                </a:solidFill>
-                <a:latin typeface="+mn-lt"/>
-                <a:ea typeface="+mn-ea"/>
-                <a:cs typeface="+mn-cs"/>
-              </a:defRPr>
-            </a:lvl8pPr>
-            <a:lvl9pPr marL="1700000" indent="-228600" algn="l" defTabSz="914400" rtl="0" eaLnBrk="1" latinLnBrk="0" hangingPunct="1">
-              <a:lnSpc>
-                <a:spcPct val="90000"/>
-              </a:lnSpc>
-              <a:spcBef>
-                <a:spcPts val="200"/>
-              </a:spcBef>
-              <a:spcAft>
-                <a:spcPts val="400"/>
-              </a:spcAft>
-              <a:buClr>
-                <a:schemeClr val="accent1"/>
-              </a:buClr>
-              <a:buFont typeface="Calibri" pitchFamily="34" charset="0"/>
-              <a:buChar char="◦"/>
-              <a:defRPr sz="1400" kern="1200">
-                <a:solidFill>
-                  <a:schemeClr val="tx1">
-                    <a:lumMod val="75000"/>
-                    <a:lumOff val="25000"/>
-                  </a:schemeClr>
-                </a:solidFill>
-                <a:latin typeface="+mn-lt"/>
-                <a:ea typeface="+mn-ea"/>
-                <a:cs typeface="+mn-cs"/>
-              </a:defRPr>
-            </a:lvl9pPr>
-          </a:lstStyle>
           <a:p>
             <a:endParaRPr lang="en-US" dirty="0"/>
           </a:p>

</xml_diff>

<commit_message>
Improved version with  left-right columns
</commit_message>
<xml_diff>
--- a/example_2/simple.pptx
+++ b/example_2/simple.pptx
@@ -361,7 +361,7 @@
           <a:p>
             <a:fld id="{9184DA70-C731-4C70-880D-CCD4705E623C}" type="datetime1">
               <a:rPr lang="en-US" smtClean="0"/>
-              <a:t>3/20/20</a:t>
+              <a:t>3/22/20</a:t>
             </a:fld>
             <a:endParaRPr lang="en-US" dirty="0"/>
           </a:p>
@@ -549,7 +549,7 @@
           <a:p>
             <a:fld id="{B612A279-0833-481D-8C56-F67FD0AC6C50}" type="datetime1">
               <a:rPr lang="en-US" smtClean="0"/>
-              <a:t>3/20/20</a:t>
+              <a:t>3/22/20</a:t>
             </a:fld>
             <a:endParaRPr lang="en-US" dirty="0"/>
           </a:p>
@@ -791,7 +791,7 @@
           <a:p>
             <a:fld id="{6587DA83-5663-4C9C-B9AA-0B40A3DAFF81}" type="datetime1">
               <a:rPr lang="en-US" smtClean="0"/>
-              <a:t>3/20/20</a:t>
+              <a:t>3/22/20</a:t>
             </a:fld>
             <a:endParaRPr lang="en-US" dirty="0"/>
           </a:p>
@@ -979,7 +979,7 @@
           <a:p>
             <a:fld id="{4BE1D723-8F53-4F53-90B0-1982A396982E}" type="datetime1">
               <a:rPr lang="en-US" smtClean="0"/>
-              <a:t>3/20/20</a:t>
+              <a:t>3/22/20</a:t>
             </a:fld>
             <a:endParaRPr lang="en-US" dirty="0"/>
           </a:p>
@@ -1352,7 +1352,7 @@
           <a:p>
             <a:fld id="{97669AF7-7BEB-44E4-9852-375E34362B5B}" type="datetime1">
               <a:rPr lang="en-US" smtClean="0"/>
-              <a:t>3/20/20</a:t>
+              <a:t>3/22/20</a:t>
             </a:fld>
             <a:endParaRPr lang="en-US" dirty="0"/>
           </a:p>
@@ -1607,7 +1607,7 @@
           <a:p>
             <a:fld id="{BAAAC38D-0552-4C82-B593-E6124DFADBE2}" type="datetime1">
               <a:rPr lang="en-US" smtClean="0"/>
-              <a:t>3/20/20</a:t>
+              <a:t>3/22/20</a:t>
             </a:fld>
             <a:endParaRPr lang="en-US" dirty="0"/>
           </a:p>
@@ -2004,7 +2004,7 @@
           <a:p>
             <a:fld id="{D9DF0F1C-5577-4ACB-BB62-DF8F3C494C7E}" type="datetime1">
               <a:rPr lang="en-US" smtClean="0"/>
-              <a:t>3/20/20</a:t>
+              <a:t>3/22/20</a:t>
             </a:fld>
             <a:endParaRPr lang="en-US" dirty="0"/>
           </a:p>
@@ -2140,7 +2140,7 @@
           <a:p>
             <a:fld id="{1775B394-D9F9-4F0C-B15D-605F45CB9E9F}" type="datetime1">
               <a:rPr lang="en-US" smtClean="0"/>
-              <a:t>3/20/20</a:t>
+              <a:t>3/22/20</a:t>
             </a:fld>
             <a:endParaRPr lang="en-US" dirty="0"/>
           </a:p>
@@ -2297,7 +2297,7 @@
           <a:p>
             <a:fld id="{39667345-2558-425A-8533-9BFDBCE15005}" type="datetime1">
               <a:rPr lang="en-US" smtClean="0"/>
-              <a:t>3/20/20</a:t>
+              <a:t>3/22/20</a:t>
             </a:fld>
             <a:endParaRPr lang="en-US" dirty="0"/>
           </a:p>
@@ -2626,7 +2626,7 @@
           <a:p>
             <a:fld id="{92BEA474-078D-4E9B-9B14-09A87B19DC46}" type="datetime1">
               <a:rPr lang="en-US" smtClean="0"/>
-              <a:t>3/20/20</a:t>
+              <a:t>3/22/20</a:t>
             </a:fld>
             <a:endParaRPr lang="en-US" dirty="0"/>
           </a:p>
@@ -2976,7 +2976,7 @@
           <a:p>
             <a:fld id="{4907D986-8816-4272-A432-0437A28A9828}" type="datetime1">
               <a:rPr lang="en-US" smtClean="0"/>
-              <a:t>3/20/20</a:t>
+              <a:t>3/22/20</a:t>
             </a:fld>
             <a:endParaRPr lang="en-US" dirty="0"/>
           </a:p>
@@ -3237,7 +3237,7 @@
           <a:p>
             <a:fld id="{62D6E202-B606-4609-B914-27C9371A1F6D}" type="datetime1">
               <a:rPr lang="en-US" smtClean="0"/>
-              <a:t>3/20/20</a:t>
+              <a:t>3/22/20</a:t>
             </a:fld>
             <a:endParaRPr lang="en-US" dirty="0"/>
           </a:p>
@@ -4119,367 +4119,7 @@
           <a:p>
             <a:r>
               <a:rPr lang="en-US" dirty="0"/>
-              <a:t>Lefty </a:t>
-            </a:r>
-            <a:r>
-              <a:rPr lang="en-US" dirty="0" err="1"/>
-              <a:t>texty</a:t>
-            </a:r>
-            <a:r>
-              <a:rPr lang="en-US" dirty="0"/>
-              <a:t> </a:t>
-            </a:r>
-            <a:r>
-              <a:rPr lang="en-US" dirty="0" err="1"/>
-              <a:t>derechi</a:t>
-            </a:r>
-            <a:r>
-              <a:rPr lang="en-US" dirty="0"/>
-              <a:t> </a:t>
-            </a:r>
-            <a:r>
-              <a:rPr lang="en-US" dirty="0" err="1"/>
-              <a:t>texti</a:t>
-            </a:r>
-            <a:r>
-              <a:rPr lang="en-US" dirty="0"/>
-              <a:t> lefty </a:t>
-            </a:r>
-            <a:r>
-              <a:rPr lang="en-US" dirty="0" err="1"/>
-              <a:t>texty</a:t>
-            </a:r>
-            <a:r>
-              <a:rPr lang="en-US" dirty="0"/>
-              <a:t> </a:t>
-            </a:r>
-            <a:r>
-              <a:rPr lang="en-US" dirty="0" err="1"/>
-              <a:t>derechi</a:t>
-            </a:r>
-            <a:r>
-              <a:rPr lang="en-US" dirty="0"/>
-              <a:t> </a:t>
-            </a:r>
-            <a:r>
-              <a:rPr lang="en-US" dirty="0" err="1"/>
-              <a:t>texti</a:t>
-            </a:r>
-            <a:r>
-              <a:rPr lang="en-US" dirty="0"/>
-              <a:t> lefty </a:t>
-            </a:r>
-            <a:r>
-              <a:rPr lang="en-US" dirty="0" err="1"/>
-              <a:t>texty</a:t>
-            </a:r>
-            <a:r>
-              <a:rPr lang="en-US" dirty="0"/>
-              <a:t> </a:t>
-            </a:r>
-            <a:r>
-              <a:rPr lang="en-US" dirty="0" err="1"/>
-              <a:t>derechi</a:t>
-            </a:r>
-            <a:r>
-              <a:rPr lang="en-US" dirty="0"/>
-              <a:t> </a:t>
-            </a:r>
-            <a:r>
-              <a:rPr lang="en-US" dirty="0" err="1"/>
-              <a:t>texti</a:t>
-            </a:r>
-            <a:r>
-              <a:rPr lang="en-US" dirty="0"/>
-              <a:t> lefty </a:t>
-            </a:r>
-            <a:r>
-              <a:rPr lang="en-US" dirty="0" err="1"/>
-              <a:t>texty</a:t>
-            </a:r>
-            <a:r>
-              <a:rPr lang="en-US" dirty="0"/>
-              <a:t> </a:t>
-            </a:r>
-            <a:r>
-              <a:rPr lang="en-US" dirty="0" err="1"/>
-              <a:t>derechi</a:t>
-            </a:r>
-            <a:r>
-              <a:rPr lang="en-US" dirty="0"/>
-              <a:t> </a:t>
-            </a:r>
-            <a:r>
-              <a:rPr lang="en-US" dirty="0" err="1"/>
-              <a:t>texti</a:t>
-            </a:r>
-            <a:r>
-              <a:rPr lang="en-US" dirty="0"/>
-              <a:t> lefty </a:t>
-            </a:r>
-            <a:r>
-              <a:rPr lang="en-US" dirty="0" err="1"/>
-              <a:t>texty</a:t>
-            </a:r>
-            <a:r>
-              <a:rPr lang="en-US" dirty="0"/>
-              <a:t> </a:t>
-            </a:r>
-            <a:r>
-              <a:rPr lang="en-US" dirty="0" err="1"/>
-              <a:t>derechi</a:t>
-            </a:r>
-            <a:r>
-              <a:rPr lang="en-US" dirty="0"/>
-              <a:t> </a:t>
-            </a:r>
-            <a:r>
-              <a:rPr lang="en-US" dirty="0" err="1"/>
-              <a:t>texti</a:t>
-            </a:r>
-            <a:r>
-              <a:rPr lang="en-US" dirty="0"/>
-              <a:t> lefty </a:t>
-            </a:r>
-            <a:r>
-              <a:rPr lang="en-US" dirty="0" err="1"/>
-              <a:t>texty</a:t>
-            </a:r>
-            <a:r>
-              <a:rPr lang="en-US" dirty="0"/>
-              <a:t> </a:t>
-            </a:r>
-            <a:r>
-              <a:rPr lang="en-US" dirty="0" err="1"/>
-              <a:t>derechi</a:t>
-            </a:r>
-            <a:r>
-              <a:rPr lang="en-US" dirty="0"/>
-              <a:t> </a:t>
-            </a:r>
-            <a:r>
-              <a:rPr lang="en-US" dirty="0" err="1"/>
-              <a:t>texti</a:t>
-            </a:r>
-            <a:r>
-              <a:rPr lang="en-US" dirty="0"/>
-              <a:t> lefty </a:t>
-            </a:r>
-            <a:r>
-              <a:rPr lang="en-US" dirty="0" err="1"/>
-              <a:t>texty</a:t>
-            </a:r>
-            <a:r>
-              <a:rPr lang="en-US" dirty="0"/>
-              <a:t> </a:t>
-            </a:r>
-            <a:r>
-              <a:rPr lang="en-US" dirty="0" err="1"/>
-              <a:t>derechi</a:t>
-            </a:r>
-            <a:r>
-              <a:rPr lang="en-US" dirty="0"/>
-              <a:t> </a:t>
-            </a:r>
-            <a:r>
-              <a:rPr lang="en-US" dirty="0" err="1"/>
-              <a:t>texti</a:t>
-            </a:r>
-            <a:r>
-              <a:rPr lang="en-US" dirty="0"/>
-              <a:t> lefty </a:t>
-            </a:r>
-            <a:r>
-              <a:rPr lang="en-US" dirty="0" err="1"/>
-              <a:t>texty</a:t>
-            </a:r>
-            <a:r>
-              <a:rPr lang="en-US" dirty="0"/>
-              <a:t> </a:t>
-            </a:r>
-            <a:r>
-              <a:rPr lang="en-US" dirty="0" err="1"/>
-              <a:t>derechi</a:t>
-            </a:r>
-            <a:r>
-              <a:rPr lang="en-US" dirty="0"/>
-              <a:t> </a:t>
-            </a:r>
-            <a:r>
-              <a:rPr lang="en-US" dirty="0" err="1"/>
-              <a:t>texti</a:t>
-            </a:r>
-            <a:r>
-              <a:rPr lang="en-US" dirty="0"/>
-              <a:t> lefty </a:t>
-            </a:r>
-            <a:r>
-              <a:rPr lang="en-US" dirty="0" err="1"/>
-              <a:t>texty</a:t>
-            </a:r>
-            <a:r>
-              <a:rPr lang="en-US" dirty="0"/>
-              <a:t> </a:t>
-            </a:r>
-            <a:r>
-              <a:rPr lang="en-US" dirty="0" err="1"/>
-              <a:t>derechi</a:t>
-            </a:r>
-            <a:r>
-              <a:rPr lang="en-US" dirty="0"/>
-              <a:t> </a:t>
-            </a:r>
-            <a:r>
-              <a:rPr lang="en-US" dirty="0" err="1"/>
-              <a:t>texti</a:t>
-            </a:r>
-            <a:r>
-              <a:rPr lang="en-US" dirty="0"/>
-              <a:t> lefty </a:t>
-            </a:r>
-            <a:r>
-              <a:rPr lang="en-US" dirty="0" err="1"/>
-              <a:t>texty</a:t>
-            </a:r>
-            <a:r>
-              <a:rPr lang="en-US" dirty="0"/>
-              <a:t> </a:t>
-            </a:r>
-            <a:r>
-              <a:rPr lang="en-US" dirty="0" err="1"/>
-              <a:t>derechi</a:t>
-            </a:r>
-            <a:r>
-              <a:rPr lang="en-US" dirty="0"/>
-              <a:t> </a:t>
-            </a:r>
-            <a:r>
-              <a:rPr lang="en-US" dirty="0" err="1"/>
-              <a:t>texti</a:t>
-            </a:r>
-            <a:r>
-              <a:rPr lang="en-US" dirty="0"/>
-              <a:t> lefty </a:t>
-            </a:r>
-            <a:r>
-              <a:rPr lang="en-US" dirty="0" err="1"/>
-              <a:t>texty</a:t>
-            </a:r>
-            <a:r>
-              <a:rPr lang="en-US" dirty="0"/>
-              <a:t> </a:t>
-            </a:r>
-            <a:r>
-              <a:rPr lang="en-US" dirty="0" err="1"/>
-              <a:t>derechi</a:t>
-            </a:r>
-            <a:r>
-              <a:rPr lang="en-US" dirty="0"/>
-              <a:t> </a:t>
-            </a:r>
-            <a:r>
-              <a:rPr lang="en-US" dirty="0" err="1"/>
-              <a:t>texti</a:t>
-            </a:r>
-            <a:r>
-              <a:rPr lang="en-US" dirty="0"/>
-              <a:t> lefty </a:t>
-            </a:r>
-            <a:r>
-              <a:rPr lang="en-US" dirty="0" err="1"/>
-              <a:t>texty</a:t>
-            </a:r>
-            <a:r>
-              <a:rPr lang="en-US" dirty="0"/>
-              <a:t> </a:t>
-            </a:r>
-            <a:r>
-              <a:rPr lang="en-US" dirty="0" err="1"/>
-              <a:t>derechi</a:t>
-            </a:r>
-            <a:r>
-              <a:rPr lang="en-US" dirty="0"/>
-              <a:t> </a:t>
-            </a:r>
-            <a:r>
-              <a:rPr lang="en-US" dirty="0" err="1"/>
-              <a:t>texti</a:t>
-            </a:r>
-            <a:r>
-              <a:rPr lang="en-US" dirty="0"/>
-              <a:t> lefty </a:t>
-            </a:r>
-            <a:r>
-              <a:rPr lang="en-US" dirty="0" err="1"/>
-              <a:t>texty</a:t>
-            </a:r>
-            <a:r>
-              <a:rPr lang="en-US" dirty="0"/>
-              <a:t> </a:t>
-            </a:r>
-            <a:r>
-              <a:rPr lang="en-US" dirty="0" err="1"/>
-              <a:t>derechi</a:t>
-            </a:r>
-            <a:r>
-              <a:rPr lang="en-US" dirty="0"/>
-              <a:t> </a:t>
-            </a:r>
-            <a:r>
-              <a:rPr lang="en-US" dirty="0" err="1"/>
-              <a:t>texti</a:t>
-            </a:r>
-            <a:r>
-              <a:rPr lang="en-US" dirty="0"/>
-              <a:t> lefty </a:t>
-            </a:r>
-            <a:r>
-              <a:rPr lang="en-US" dirty="0" err="1"/>
-              <a:t>texty</a:t>
-            </a:r>
-            <a:r>
-              <a:rPr lang="en-US" dirty="0"/>
-              <a:t> </a:t>
-            </a:r>
-            <a:r>
-              <a:rPr lang="en-US" dirty="0" err="1"/>
-              <a:t>derechi</a:t>
-            </a:r>
-            <a:r>
-              <a:rPr lang="en-US" dirty="0"/>
-              <a:t> </a:t>
-            </a:r>
-            <a:r>
-              <a:rPr lang="en-US" dirty="0" err="1"/>
-              <a:t>texti</a:t>
-            </a:r>
-            <a:r>
-              <a:rPr lang="en-US" dirty="0"/>
-              <a:t> lefty </a:t>
-            </a:r>
-            <a:r>
-              <a:rPr lang="en-US" dirty="0" err="1"/>
-              <a:t>texty</a:t>
-            </a:r>
-            <a:r>
-              <a:rPr lang="en-US" dirty="0"/>
-              <a:t> </a:t>
-            </a:r>
-            <a:r>
-              <a:rPr lang="en-US" dirty="0" err="1"/>
-              <a:t>derechi</a:t>
-            </a:r>
-            <a:r>
-              <a:rPr lang="en-US" dirty="0"/>
-              <a:t> </a:t>
-            </a:r>
-            <a:r>
-              <a:rPr lang="en-US" dirty="0" err="1"/>
-              <a:t>texti</a:t>
-            </a:r>
-            <a:r>
-              <a:rPr lang="en-US" dirty="0"/>
-              <a:t>.</a:t>
+              <a:t>Lefty texty derechi texti lefty texty derechi texti lefty texty derechi texti lefty texty derechi texti lefty texty derechi texti lefty texty derechi texti lefty texty derechi texti lefty texty derechi texti lefty texty derechi texti lefty texty derechi texti lefty texty derechi texti lefty texty derechi texti lefty texty derechi texti lefty texty derechi texti lefty texty derechi texti.</a:t>
             </a:r>
           </a:p>
           <a:p>
@@ -4604,391 +4244,7 @@
           <a:p>
             <a:r>
               <a:rPr lang="en-US" dirty="0"/>
-              <a:t>Righty </a:t>
-            </a:r>
-            <a:r>
-              <a:rPr lang="en-US" dirty="0" err="1"/>
-              <a:t>texty</a:t>
-            </a:r>
-            <a:r>
-              <a:rPr lang="en-US" dirty="0"/>
-              <a:t> </a:t>
-            </a:r>
-            <a:r>
-              <a:rPr lang="en-US" dirty="0" err="1"/>
-              <a:t>derechi</a:t>
-            </a:r>
-            <a:r>
-              <a:rPr lang="en-US" dirty="0"/>
-              <a:t> </a:t>
-            </a:r>
-            <a:r>
-              <a:rPr lang="en-US" dirty="0" err="1"/>
-              <a:t>texti</a:t>
-            </a:r>
-            <a:r>
-              <a:rPr lang="en-US" dirty="0"/>
-              <a:t> righty </a:t>
-            </a:r>
-            <a:r>
-              <a:rPr lang="en-US" dirty="0" err="1"/>
-              <a:t>texty</a:t>
-            </a:r>
-            <a:r>
-              <a:rPr lang="en-US" dirty="0"/>
-              <a:t> </a:t>
-            </a:r>
-            <a:r>
-              <a:rPr lang="en-US" dirty="0" err="1"/>
-              <a:t>derechi</a:t>
-            </a:r>
-            <a:r>
-              <a:rPr lang="en-US" dirty="0"/>
-              <a:t> </a:t>
-            </a:r>
-            <a:r>
-              <a:rPr lang="en-US" dirty="0" err="1"/>
-              <a:t>texti</a:t>
-            </a:r>
-            <a:r>
-              <a:rPr lang="en-US" dirty="0"/>
-              <a:t> righty </a:t>
-            </a:r>
-            <a:r>
-              <a:rPr lang="en-US" dirty="0" err="1"/>
-              <a:t>texty</a:t>
-            </a:r>
-            <a:r>
-              <a:rPr lang="en-US" dirty="0"/>
-              <a:t> </a:t>
-            </a:r>
-            <a:r>
-              <a:rPr lang="en-US" dirty="0" err="1"/>
-              <a:t>derechi</a:t>
-            </a:r>
-            <a:r>
-              <a:rPr lang="en-US" dirty="0"/>
-              <a:t> </a:t>
-            </a:r>
-            <a:r>
-              <a:rPr lang="en-US" dirty="0" err="1"/>
-              <a:t>texti</a:t>
-            </a:r>
-            <a:r>
-              <a:rPr lang="en-US" dirty="0"/>
-              <a:t> righty </a:t>
-            </a:r>
-            <a:r>
-              <a:rPr lang="en-US" dirty="0" err="1"/>
-              <a:t>texty</a:t>
-            </a:r>
-            <a:r>
-              <a:rPr lang="en-US" dirty="0"/>
-              <a:t> </a:t>
-            </a:r>
-            <a:r>
-              <a:rPr lang="en-US" dirty="0" err="1"/>
-              <a:t>derechi</a:t>
-            </a:r>
-            <a:r>
-              <a:rPr lang="en-US" dirty="0"/>
-              <a:t> </a:t>
-            </a:r>
-            <a:r>
-              <a:rPr lang="en-US" dirty="0" err="1"/>
-              <a:t>texti</a:t>
-            </a:r>
-            <a:r>
-              <a:rPr lang="en-US" dirty="0"/>
-              <a:t> righty </a:t>
-            </a:r>
-            <a:r>
-              <a:rPr lang="en-US" dirty="0" err="1"/>
-              <a:t>texty</a:t>
-            </a:r>
-            <a:r>
-              <a:rPr lang="en-US" dirty="0"/>
-              <a:t> </a:t>
-            </a:r>
-            <a:r>
-              <a:rPr lang="en-US" dirty="0" err="1"/>
-              <a:t>derechi</a:t>
-            </a:r>
-            <a:r>
-              <a:rPr lang="en-US" dirty="0"/>
-              <a:t> </a:t>
-            </a:r>
-            <a:r>
-              <a:rPr lang="en-US" dirty="0" err="1"/>
-              <a:t>texti</a:t>
-            </a:r>
-            <a:r>
-              <a:rPr lang="en-US" dirty="0"/>
-              <a:t> righty </a:t>
-            </a:r>
-            <a:r>
-              <a:rPr lang="en-US" dirty="0" err="1"/>
-              <a:t>texty</a:t>
-            </a:r>
-            <a:r>
-              <a:rPr lang="en-US" dirty="0"/>
-              <a:t> </a:t>
-            </a:r>
-            <a:r>
-              <a:rPr lang="en-US" dirty="0" err="1"/>
-              <a:t>derechi</a:t>
-            </a:r>
-            <a:r>
-              <a:rPr lang="en-US" dirty="0"/>
-              <a:t> </a:t>
-            </a:r>
-            <a:r>
-              <a:rPr lang="en-US" dirty="0" err="1"/>
-              <a:t>texti</a:t>
-            </a:r>
-            <a:r>
-              <a:rPr lang="en-US" dirty="0"/>
-              <a:t> righty </a:t>
-            </a:r>
-            <a:r>
-              <a:rPr lang="en-US" dirty="0" err="1"/>
-              <a:t>texty</a:t>
-            </a:r>
-            <a:r>
-              <a:rPr lang="en-US" dirty="0"/>
-              <a:t> </a:t>
-            </a:r>
-            <a:r>
-              <a:rPr lang="en-US" dirty="0" err="1"/>
-              <a:t>derechi</a:t>
-            </a:r>
-            <a:r>
-              <a:rPr lang="en-US" dirty="0"/>
-              <a:t> </a:t>
-            </a:r>
-            <a:r>
-              <a:rPr lang="en-US" dirty="0" err="1"/>
-              <a:t>texti</a:t>
-            </a:r>
-            <a:r>
-              <a:rPr lang="en-US" dirty="0"/>
-              <a:t> righty </a:t>
-            </a:r>
-            <a:r>
-              <a:rPr lang="en-US" dirty="0" err="1"/>
-              <a:t>texty</a:t>
-            </a:r>
-            <a:r>
-              <a:rPr lang="en-US" dirty="0"/>
-              <a:t> </a:t>
-            </a:r>
-            <a:r>
-              <a:rPr lang="en-US" dirty="0" err="1"/>
-              <a:t>derechi</a:t>
-            </a:r>
-            <a:r>
-              <a:rPr lang="en-US" dirty="0"/>
-              <a:t> </a:t>
-            </a:r>
-            <a:r>
-              <a:rPr lang="en-US" dirty="0" err="1"/>
-              <a:t>texti</a:t>
-            </a:r>
-            <a:r>
-              <a:rPr lang="en-US" dirty="0"/>
-              <a:t> righty </a:t>
-            </a:r>
-            <a:r>
-              <a:rPr lang="en-US" dirty="0" err="1"/>
-              <a:t>texty</a:t>
-            </a:r>
-            <a:r>
-              <a:rPr lang="en-US" dirty="0"/>
-              <a:t> </a:t>
-            </a:r>
-            <a:r>
-              <a:rPr lang="en-US" dirty="0" err="1"/>
-              <a:t>derechi</a:t>
-            </a:r>
-            <a:r>
-              <a:rPr lang="en-US" dirty="0"/>
-              <a:t> </a:t>
-            </a:r>
-            <a:r>
-              <a:rPr lang="en-US" dirty="0" err="1"/>
-              <a:t>texti</a:t>
-            </a:r>
-            <a:r>
-              <a:rPr lang="en-US" dirty="0"/>
-              <a:t> righty </a:t>
-            </a:r>
-            <a:r>
-              <a:rPr lang="en-US" dirty="0" err="1"/>
-              <a:t>texty</a:t>
-            </a:r>
-            <a:r>
-              <a:rPr lang="en-US" dirty="0"/>
-              <a:t> </a:t>
-            </a:r>
-            <a:r>
-              <a:rPr lang="en-US" dirty="0" err="1"/>
-              <a:t>derechi</a:t>
-            </a:r>
-            <a:r>
-              <a:rPr lang="en-US" dirty="0"/>
-              <a:t> </a:t>
-            </a:r>
-            <a:r>
-              <a:rPr lang="en-US" dirty="0" err="1"/>
-              <a:t>texti</a:t>
-            </a:r>
-            <a:r>
-              <a:rPr lang="en-US" dirty="0"/>
-              <a:t> righty </a:t>
-            </a:r>
-            <a:r>
-              <a:rPr lang="en-US" dirty="0" err="1"/>
-              <a:t>texty</a:t>
-            </a:r>
-            <a:r>
-              <a:rPr lang="en-US" dirty="0"/>
-              <a:t> </a:t>
-            </a:r>
-            <a:r>
-              <a:rPr lang="en-US" dirty="0" err="1"/>
-              <a:t>derechi</a:t>
-            </a:r>
-            <a:r>
-              <a:rPr lang="en-US" dirty="0"/>
-              <a:t> </a:t>
-            </a:r>
-            <a:r>
-              <a:rPr lang="en-US" dirty="0" err="1"/>
-              <a:t>texti</a:t>
-            </a:r>
-            <a:r>
-              <a:rPr lang="en-US" dirty="0"/>
-              <a:t> righty </a:t>
-            </a:r>
-            <a:r>
-              <a:rPr lang="en-US" dirty="0" err="1"/>
-              <a:t>texty</a:t>
-            </a:r>
-            <a:r>
-              <a:rPr lang="en-US" dirty="0"/>
-              <a:t> </a:t>
-            </a:r>
-            <a:r>
-              <a:rPr lang="en-US" dirty="0" err="1"/>
-              <a:t>derechi</a:t>
-            </a:r>
-            <a:r>
-              <a:rPr lang="en-US" dirty="0"/>
-              <a:t> </a:t>
-            </a:r>
-            <a:r>
-              <a:rPr lang="en-US" dirty="0" err="1"/>
-              <a:t>texti</a:t>
-            </a:r>
-            <a:r>
-              <a:rPr lang="en-US" dirty="0"/>
-              <a:t> righty </a:t>
-            </a:r>
-            <a:r>
-              <a:rPr lang="en-US" dirty="0" err="1"/>
-              <a:t>texty</a:t>
-            </a:r>
-            <a:r>
-              <a:rPr lang="en-US" dirty="0"/>
-              <a:t> </a:t>
-            </a:r>
-            <a:r>
-              <a:rPr lang="en-US" dirty="0" err="1"/>
-              <a:t>derechi</a:t>
-            </a:r>
-            <a:r>
-              <a:rPr lang="en-US" dirty="0"/>
-              <a:t> </a:t>
-            </a:r>
-            <a:r>
-              <a:rPr lang="en-US" dirty="0" err="1"/>
-              <a:t>texti</a:t>
-            </a:r>
-            <a:r>
-              <a:rPr lang="en-US" dirty="0"/>
-              <a:t> righty </a:t>
-            </a:r>
-            <a:r>
-              <a:rPr lang="en-US" dirty="0" err="1"/>
-              <a:t>texty</a:t>
-            </a:r>
-            <a:r>
-              <a:rPr lang="en-US" dirty="0"/>
-              <a:t> </a:t>
-            </a:r>
-            <a:r>
-              <a:rPr lang="en-US" dirty="0" err="1"/>
-              <a:t>derechi</a:t>
-            </a:r>
-            <a:r>
-              <a:rPr lang="en-US" dirty="0"/>
-              <a:t> </a:t>
-            </a:r>
-            <a:r>
-              <a:rPr lang="en-US" dirty="0" err="1"/>
-              <a:t>texti</a:t>
-            </a:r>
-            <a:r>
-              <a:rPr lang="en-US" dirty="0"/>
-              <a:t> righty </a:t>
-            </a:r>
-            <a:r>
-              <a:rPr lang="en-US" dirty="0" err="1"/>
-              <a:t>texty</a:t>
-            </a:r>
-            <a:r>
-              <a:rPr lang="en-US" dirty="0"/>
-              <a:t> </a:t>
-            </a:r>
-            <a:r>
-              <a:rPr lang="en-US" dirty="0" err="1"/>
-              <a:t>derechi</a:t>
-            </a:r>
-            <a:r>
-              <a:rPr lang="en-US" dirty="0"/>
-              <a:t> </a:t>
-            </a:r>
-            <a:r>
-              <a:rPr lang="en-US" dirty="0" err="1"/>
-              <a:t>texti</a:t>
-            </a:r>
-            <a:r>
-              <a:rPr lang="en-US" dirty="0"/>
-              <a:t> righty </a:t>
-            </a:r>
-            <a:r>
-              <a:rPr lang="en-US" dirty="0" err="1"/>
-              <a:t>texty</a:t>
-            </a:r>
-            <a:r>
-              <a:rPr lang="en-US" dirty="0"/>
-              <a:t> </a:t>
-            </a:r>
-            <a:r>
-              <a:rPr lang="en-US" dirty="0" err="1"/>
-              <a:t>derechi</a:t>
-            </a:r>
-            <a:r>
-              <a:rPr lang="en-US" dirty="0"/>
-              <a:t> </a:t>
-            </a:r>
-            <a:r>
-              <a:rPr lang="en-US" dirty="0" err="1"/>
-              <a:t>texti</a:t>
-            </a:r>
-            <a:r>
-              <a:rPr lang="en-US" dirty="0"/>
-              <a:t>.</a:t>
+              <a:t>Righty texty derechi texti righty texty derechi texti righty texty derechi texti righty texty derechi texti righty texty derechi texti righty texty derechi texti righty texty derechi texti righty texty derechi texti righty texty derechi texti righty texty derechi texti righty texty derechi texti righty texty derechi texti righty texty derechi texti righty texty derechi texti righty texty derechi texti righty texty derechi texti.</a:t>
             </a:r>
           </a:p>
           <a:p>
@@ -5126,13 +4382,13 @@
         </p:spPr>
         <p:txBody>
           <a:bodyPr>
-            <a:normAutofit fontScale="92500" lnSpcReduction="20000"/>
+            <a:normAutofit fontScale="92500" lnSpcReduction="10000"/>
           </a:bodyPr>
           <a:lstStyle/>
           <a:p>
             <a:r>
               <a:rPr lang="en-US" dirty="0"/>
-              <a:t>Top right content - Top right content - Top right content - Top right content - Top right content - Top right content - Top right content - Top right content - Top right content - Top right content - Top right content - Top right content - Top right content - Top right content - Top right content - Top right content - Top right content - Top right content -</a:t>
+              <a:t>Top right content 01 - Top right content 02 - Top right content 03 - Top right content 04 - Top right content 05 - Top right content 06 - Top right content 07 - Top right content 08 - Top right content 09 - Top right content 10</a:t>
             </a:r>
           </a:p>
         </p:txBody>
@@ -5156,242 +4412,19 @@
         <p:spPr>
           <a:xfrm>
             <a:off x="1097280" y="2120901"/>
-            <a:ext cx="3863602" cy="3748193"/>
+            <a:ext cx="3027680" cy="3748193"/>
           </a:xfrm>
         </p:spPr>
         <p:txBody>
           <a:bodyPr>
-            <a:normAutofit fontScale="92500" lnSpcReduction="20000"/>
+            <a:normAutofit fontScale="92500" lnSpcReduction="10000"/>
           </a:bodyPr>
           <a:lstStyle/>
           <a:p>
             <a:r>
-              <a:rPr lang="en-US" dirty="0" err="1"/>
-              <a:t>Leftside</a:t>
-            </a:r>
-            <a:r>
               <a:rPr lang="en-US" dirty="0"/>
-              <a:t> content - </a:t>
-            </a:r>
-            <a:r>
-              <a:rPr lang="en-US" dirty="0" err="1"/>
-              <a:t>Leftside</a:t>
-            </a:r>
-            <a:r>
-              <a:rPr lang="en-US" dirty="0"/>
-              <a:t> content - </a:t>
-            </a:r>
-            <a:r>
-              <a:rPr lang="en-US" dirty="0" err="1"/>
-              <a:t>Leftside</a:t>
-            </a:r>
-            <a:r>
-              <a:rPr lang="en-US" dirty="0"/>
-              <a:t> content - </a:t>
-            </a:r>
-            <a:r>
-              <a:rPr lang="en-US" dirty="0" err="1"/>
-              <a:t>Leftside</a:t>
-            </a:r>
-            <a:r>
-              <a:rPr lang="en-US" dirty="0"/>
-              <a:t> content - </a:t>
-            </a:r>
-            <a:r>
-              <a:rPr lang="en-US" dirty="0" err="1"/>
-              <a:t>Leftside</a:t>
-            </a:r>
-            <a:r>
-              <a:rPr lang="en-US" dirty="0"/>
-              <a:t> content - </a:t>
-            </a:r>
-            <a:r>
-              <a:rPr lang="en-US" dirty="0" err="1"/>
-              <a:t>Leftside</a:t>
-            </a:r>
-            <a:r>
-              <a:rPr lang="en-US" dirty="0"/>
-              <a:t> content - </a:t>
-            </a:r>
-            <a:r>
-              <a:rPr lang="en-US" dirty="0" err="1"/>
-              <a:t>Leftside</a:t>
-            </a:r>
-            <a:r>
-              <a:rPr lang="en-US" dirty="0"/>
-              <a:t> content - </a:t>
-            </a:r>
-            <a:r>
-              <a:rPr lang="en-US" dirty="0" err="1"/>
-              <a:t>Leftside</a:t>
-            </a:r>
-            <a:r>
-              <a:rPr lang="en-US" dirty="0"/>
-              <a:t> content - </a:t>
-            </a:r>
-            <a:r>
-              <a:rPr lang="en-US" dirty="0" err="1"/>
-              <a:t>Leftside</a:t>
-            </a:r>
-            <a:r>
-              <a:rPr lang="en-US" dirty="0"/>
-              <a:t> content - </a:t>
-            </a:r>
-            <a:r>
-              <a:rPr lang="en-US" dirty="0" err="1"/>
-              <a:t>Leftside</a:t>
-            </a:r>
-            <a:r>
-              <a:rPr lang="en-US" dirty="0"/>
-              <a:t> content - </a:t>
-            </a:r>
-            <a:r>
-              <a:rPr lang="en-US" dirty="0" err="1"/>
-              <a:t>Leftside</a:t>
-            </a:r>
-            <a:r>
-              <a:rPr lang="en-US" dirty="0"/>
-              <a:t> content - </a:t>
-            </a:r>
-            <a:r>
-              <a:rPr lang="en-US" dirty="0" err="1"/>
-              <a:t>Leftside</a:t>
-            </a:r>
-            <a:r>
-              <a:rPr lang="en-US" dirty="0"/>
-              <a:t> content - </a:t>
-            </a:r>
-            <a:r>
-              <a:rPr lang="en-US" dirty="0" err="1"/>
-              <a:t>Leftside</a:t>
-            </a:r>
-            <a:r>
-              <a:rPr lang="en-US" dirty="0"/>
-              <a:t> content - </a:t>
-            </a:r>
-            <a:r>
-              <a:rPr lang="en-US" dirty="0" err="1"/>
-              <a:t>Leftside</a:t>
-            </a:r>
-            <a:r>
-              <a:rPr lang="en-US" dirty="0"/>
-              <a:t> content - </a:t>
-            </a:r>
-            <a:r>
-              <a:rPr lang="en-US" dirty="0" err="1"/>
-              <a:t>Leftside</a:t>
-            </a:r>
-            <a:r>
-              <a:rPr lang="en-US" dirty="0"/>
-              <a:t> content - </a:t>
-            </a:r>
-            <a:r>
-              <a:rPr lang="en-US" dirty="0" err="1"/>
-              <a:t>Leftside</a:t>
-            </a:r>
-            <a:r>
-              <a:rPr lang="en-US" dirty="0"/>
-              <a:t> content - </a:t>
-            </a:r>
-            <a:r>
-              <a:rPr lang="en-US" dirty="0" err="1"/>
-              <a:t>Leftside</a:t>
-            </a:r>
-            <a:r>
-              <a:rPr lang="en-US" dirty="0"/>
-              <a:t> content - </a:t>
-            </a:r>
-            <a:r>
-              <a:rPr lang="en-US" dirty="0" err="1"/>
-              <a:t>Leftside</a:t>
-            </a:r>
-            <a:r>
-              <a:rPr lang="en-US" dirty="0"/>
-              <a:t> content - </a:t>
-            </a:r>
-            <a:r>
-              <a:rPr lang="en-US" dirty="0" err="1"/>
-              <a:t>Leftside</a:t>
-            </a:r>
-            <a:r>
-              <a:rPr lang="en-US" dirty="0"/>
-              <a:t> content - </a:t>
-            </a:r>
-            <a:r>
-              <a:rPr lang="en-US" dirty="0" err="1"/>
-              <a:t>Leftside</a:t>
-            </a:r>
-            <a:r>
-              <a:rPr lang="en-US" dirty="0"/>
-              <a:t> content - </a:t>
-            </a:r>
-            <a:r>
-              <a:rPr lang="en-US" dirty="0" err="1"/>
-              <a:t>Leftside</a:t>
-            </a:r>
-            <a:r>
-              <a:rPr lang="en-US" dirty="0"/>
-              <a:t> content - </a:t>
-            </a:r>
-            <a:r>
-              <a:rPr lang="en-US" dirty="0" err="1"/>
-              <a:t>Leftside</a:t>
-            </a:r>
-            <a:r>
-              <a:rPr lang="en-US" dirty="0"/>
-              <a:t> content - </a:t>
-            </a:r>
-            <a:r>
-              <a:rPr lang="en-US" dirty="0" err="1"/>
-              <a:t>Leftside</a:t>
-            </a:r>
-            <a:r>
-              <a:rPr lang="en-US" dirty="0"/>
-              <a:t> content - </a:t>
-            </a:r>
-            <a:r>
-              <a:rPr lang="en-US" dirty="0" err="1"/>
-              <a:t>Leftside</a:t>
-            </a:r>
-            <a:r>
-              <a:rPr lang="en-US" dirty="0"/>
-              <a:t> content - </a:t>
-            </a:r>
-            <a:r>
-              <a:rPr lang="en-US" dirty="0" err="1"/>
-              <a:t>Leftside</a:t>
-            </a:r>
-            <a:r>
-              <a:rPr lang="en-US" dirty="0"/>
-              <a:t> content - </a:t>
-            </a:r>
-            <a:r>
-              <a:rPr lang="en-US" dirty="0" err="1"/>
-              <a:t>Leftside</a:t>
-            </a:r>
-            <a:r>
-              <a:rPr lang="en-US" dirty="0"/>
-              <a:t> content - </a:t>
-            </a:r>
-            <a:r>
-              <a:rPr lang="en-US" dirty="0" err="1"/>
-              <a:t>Leftside</a:t>
-            </a:r>
-            <a:r>
-              <a:rPr lang="en-US" dirty="0"/>
-              <a:t> content - </a:t>
-            </a:r>
-            <a:r>
-              <a:rPr lang="en-US" dirty="0" err="1"/>
-              <a:t>Leftside</a:t>
-            </a:r>
-            <a:r>
-              <a:rPr lang="en-US" dirty="0"/>
-              <a:t> content -  </a:t>
-            </a:r>
-          </a:p>
-          <a:p>
-            <a:endParaRPr lang="en-US" dirty="0"/>
+              <a:t>Leftside content 01 - Leftside content 02 - Leftside content 03 - Leftside content 04 - Leftside content 05 - Leftside content 06 - Leftside content 07 - Leftside content 08 - Leftside content 09- Leftside content 10 - Leftside content 11 - Leftside content 12 - Leftside content 13 - Leftside content 14 - Leftside content 15</a:t>
+            </a:r>
           </a:p>
         </p:txBody>
       </p:sp>
@@ -5411,8 +4444,8 @@
         </p:nvSpPr>
         <p:spPr>
           <a:xfrm>
-            <a:off x="5760719" y="4059977"/>
-            <a:ext cx="4656084" cy="1888768"/>
+            <a:off x="5090158" y="3926492"/>
+            <a:ext cx="6065522" cy="1888768"/>
           </a:xfrm>
           <a:prstGeom prst="rect">
             <a:avLst/>
@@ -5669,7 +4702,7 @@
             </a:pPr>
             <a:r>
               <a:rPr lang="en-US" sz="1700" dirty="0"/>
-              <a:t>Bottom right content - Bottom right content - Bottom right content - Bottom right content - Bottom right content - Bottom right content - Bottom right content - Bottom right content - Bottom right content - Bottom right content - Bottom right content - Bottom right content -</a:t>
+              <a:t>Bottom right content 01 - Bottom right content 02 - Bottom right content 03 - Bottom right content 04 - Bottom right content 05 - Bottom right content 06 - Bottom right content 07 - Bottom right content 08 - Bottom right content 09 - Bottom right content 10</a:t>
             </a:r>
           </a:p>
         </p:txBody>

</xml_diff>